<commit_message>
Small addition to our todo.
</commit_message>
<xml_diff>
--- a/docs/4_17_presentation.pptx
+++ b/docs/4_17_presentation.pptx
@@ -165,7 +165,7 @@
           <a:noFill/>
           <a:extLst>
             <a:ext uri="{909E8E84-426E-40dd-AFC4-6F175D3DCCD1}">
-              <a14:hiddenFill xmlns="" xmlns:a14="http://schemas.microsoft.com/office/drawing/2010/main">
+              <a14:hiddenFill xmlns:a14="http://schemas.microsoft.com/office/drawing/2010/main" xmlns="">
                 <a:solidFill>
                   <a:srgbClr val="FFFFFF"/>
                 </a:solidFill>
@@ -225,7 +225,7 @@
             </a:ln>
             <a:extLst>
               <a:ext uri="{91240B29-F687-4f45-9708-019B960494DF}">
-                <a14:hiddenLine xmlns="" xmlns:a14="http://schemas.microsoft.com/office/drawing/2010/main" w="9525">
+                <a14:hiddenLine xmlns:a14="http://schemas.microsoft.com/office/drawing/2010/main" xmlns="" w="9525">
                   <a:solidFill>
                     <a:srgbClr val="000000"/>
                   </a:solidFill>
@@ -315,7 +315,7 @@
             </a:ln>
             <a:extLst>
               <a:ext uri="{91240B29-F687-4f45-9708-019B960494DF}">
-                <a14:hiddenLine xmlns="" xmlns:a14="http://schemas.microsoft.com/office/drawing/2010/main" w="9525">
+                <a14:hiddenLine xmlns:a14="http://schemas.microsoft.com/office/drawing/2010/main" xmlns="" w="9525">
                   <a:solidFill>
                     <a:srgbClr val="000000"/>
                   </a:solidFill>
@@ -405,7 +405,7 @@
             </a:ln>
             <a:extLst>
               <a:ext uri="{91240B29-F687-4f45-9708-019B960494DF}">
-                <a14:hiddenLine xmlns="" xmlns:a14="http://schemas.microsoft.com/office/drawing/2010/main" w="9525">
+                <a14:hiddenLine xmlns:a14="http://schemas.microsoft.com/office/drawing/2010/main" xmlns="" w="9525">
                   <a:solidFill>
                     <a:srgbClr val="000000"/>
                   </a:solidFill>
@@ -439,7 +439,7 @@
             </a:ln>
             <a:extLst>
               <a:ext uri="{91240B29-F687-4f45-9708-019B960494DF}">
-                <a14:hiddenLine xmlns="" xmlns:a14="http://schemas.microsoft.com/office/drawing/2010/main" w="9525">
+                <a14:hiddenLine xmlns:a14="http://schemas.microsoft.com/office/drawing/2010/main" xmlns="" w="9525">
                   <a:solidFill>
                     <a:srgbClr val="000000"/>
                   </a:solidFill>
@@ -529,7 +529,7 @@
             </a:ln>
             <a:extLst>
               <a:ext uri="{91240B29-F687-4f45-9708-019B960494DF}">
-                <a14:hiddenLine xmlns="" xmlns:a14="http://schemas.microsoft.com/office/drawing/2010/main" w="9525">
+                <a14:hiddenLine xmlns:a14="http://schemas.microsoft.com/office/drawing/2010/main" xmlns="" w="9525">
                   <a:solidFill>
                     <a:srgbClr val="000000"/>
                   </a:solidFill>
@@ -591,7 +591,7 @@
             </a:ln>
             <a:extLst>
               <a:ext uri="{91240B29-F687-4f45-9708-019B960494DF}">
-                <a14:hiddenLine xmlns="" xmlns:a14="http://schemas.microsoft.com/office/drawing/2010/main" w="9525">
+                <a14:hiddenLine xmlns:a14="http://schemas.microsoft.com/office/drawing/2010/main" xmlns="" w="9525">
                   <a:solidFill>
                     <a:srgbClr val="000000"/>
                   </a:solidFill>
@@ -653,7 +653,7 @@
             </a:ln>
             <a:extLst>
               <a:ext uri="{91240B29-F687-4f45-9708-019B960494DF}">
-                <a14:hiddenLine xmlns="" xmlns:a14="http://schemas.microsoft.com/office/drawing/2010/main" w="9525">
+                <a14:hiddenLine xmlns:a14="http://schemas.microsoft.com/office/drawing/2010/main" xmlns="" w="9525">
                   <a:solidFill>
                     <a:srgbClr val="000000"/>
                   </a:solidFill>
@@ -743,7 +743,7 @@
             </a:ln>
             <a:extLst>
               <a:ext uri="{91240B29-F687-4f45-9708-019B960494DF}">
-                <a14:hiddenLine xmlns="" xmlns:a14="http://schemas.microsoft.com/office/drawing/2010/main" w="9525">
+                <a14:hiddenLine xmlns:a14="http://schemas.microsoft.com/office/drawing/2010/main" xmlns="" w="9525">
                   <a:solidFill>
                     <a:srgbClr val="000000"/>
                   </a:solidFill>
@@ -805,7 +805,7 @@
             </a:ln>
             <a:extLst>
               <a:ext uri="{91240B29-F687-4f45-9708-019B960494DF}">
-                <a14:hiddenLine xmlns="" xmlns:a14="http://schemas.microsoft.com/office/drawing/2010/main" w="9525">
+                <a14:hiddenLine xmlns:a14="http://schemas.microsoft.com/office/drawing/2010/main" xmlns="" w="9525">
                   <a:solidFill>
                     <a:srgbClr val="000000"/>
                   </a:solidFill>
@@ -867,7 +867,7 @@
             </a:ln>
             <a:extLst>
               <a:ext uri="{91240B29-F687-4f45-9708-019B960494DF}">
-                <a14:hiddenLine xmlns="" xmlns:a14="http://schemas.microsoft.com/office/drawing/2010/main" w="9525">
+                <a14:hiddenLine xmlns:a14="http://schemas.microsoft.com/office/drawing/2010/main" xmlns="" w="9525">
                   <a:solidFill>
                     <a:srgbClr val="000000"/>
                   </a:solidFill>
@@ -957,7 +957,7 @@
             </a:ln>
             <a:extLst>
               <a:ext uri="{91240B29-F687-4f45-9708-019B960494DF}">
-                <a14:hiddenLine xmlns="" xmlns:a14="http://schemas.microsoft.com/office/drawing/2010/main" w="9525">
+                <a14:hiddenLine xmlns:a14="http://schemas.microsoft.com/office/drawing/2010/main" xmlns="" w="9525">
                   <a:solidFill>
                     <a:srgbClr val="000000"/>
                   </a:solidFill>
@@ -1047,7 +1047,7 @@
             </a:ln>
             <a:extLst>
               <a:ext uri="{91240B29-F687-4f45-9708-019B960494DF}">
-                <a14:hiddenLine xmlns="" xmlns:a14="http://schemas.microsoft.com/office/drawing/2010/main" w="9525">
+                <a14:hiddenLine xmlns:a14="http://schemas.microsoft.com/office/drawing/2010/main" xmlns="" w="9525">
                   <a:solidFill>
                     <a:srgbClr val="000000"/>
                   </a:solidFill>
@@ -1109,7 +1109,7 @@
             </a:ln>
             <a:extLst>
               <a:ext uri="{91240B29-F687-4f45-9708-019B960494DF}">
-                <a14:hiddenLine xmlns="" xmlns:a14="http://schemas.microsoft.com/office/drawing/2010/main" w="9525">
+                <a14:hiddenLine xmlns:a14="http://schemas.microsoft.com/office/drawing/2010/main" xmlns="" w="9525">
                   <a:solidFill>
                     <a:srgbClr val="000000"/>
                   </a:solidFill>
@@ -1219,7 +1219,7 @@
             </a:ln>
             <a:extLst>
               <a:ext uri="{91240B29-F687-4f45-9708-019B960494DF}">
-                <a14:hiddenLine xmlns="" xmlns:a14="http://schemas.microsoft.com/office/drawing/2010/main" w="9525">
+                <a14:hiddenLine xmlns:a14="http://schemas.microsoft.com/office/drawing/2010/main" xmlns="" w="9525">
                   <a:solidFill>
                     <a:srgbClr val="000000"/>
                   </a:solidFill>
@@ -1281,7 +1281,7 @@
             </a:ln>
             <a:extLst>
               <a:ext uri="{91240B29-F687-4f45-9708-019B960494DF}">
-                <a14:hiddenLine xmlns="" xmlns:a14="http://schemas.microsoft.com/office/drawing/2010/main" w="9525">
+                <a14:hiddenLine xmlns:a14="http://schemas.microsoft.com/office/drawing/2010/main" xmlns="" w="9525">
                   <a:solidFill>
                     <a:srgbClr val="000000"/>
                   </a:solidFill>
@@ -1371,7 +1371,7 @@
             </a:ln>
             <a:extLst>
               <a:ext uri="{91240B29-F687-4f45-9708-019B960494DF}">
-                <a14:hiddenLine xmlns="" xmlns:a14="http://schemas.microsoft.com/office/drawing/2010/main" w="9525">
+                <a14:hiddenLine xmlns:a14="http://schemas.microsoft.com/office/drawing/2010/main" xmlns="" w="9525">
                   <a:solidFill>
                     <a:srgbClr val="000000"/>
                   </a:solidFill>
@@ -1461,7 +1461,7 @@
             </a:ln>
             <a:extLst>
               <a:ext uri="{91240B29-F687-4f45-9708-019B960494DF}">
-                <a14:hiddenLine xmlns="" xmlns:a14="http://schemas.microsoft.com/office/drawing/2010/main" w="9525">
+                <a14:hiddenLine xmlns:a14="http://schemas.microsoft.com/office/drawing/2010/main" xmlns="" w="9525">
                   <a:solidFill>
                     <a:srgbClr val="000000"/>
                   </a:solidFill>
@@ -1523,7 +1523,7 @@
             </a:ln>
             <a:extLst>
               <a:ext uri="{91240B29-F687-4f45-9708-019B960494DF}">
-                <a14:hiddenLine xmlns="" xmlns:a14="http://schemas.microsoft.com/office/drawing/2010/main" w="9525">
+                <a14:hiddenLine xmlns:a14="http://schemas.microsoft.com/office/drawing/2010/main" xmlns="" w="9525">
                   <a:solidFill>
                     <a:srgbClr val="000000"/>
                   </a:solidFill>
@@ -1613,7 +1613,7 @@
             </a:ln>
             <a:extLst>
               <a:ext uri="{91240B29-F687-4f45-9708-019B960494DF}">
-                <a14:hiddenLine xmlns="" xmlns:a14="http://schemas.microsoft.com/office/drawing/2010/main" w="9525">
+                <a14:hiddenLine xmlns:a14="http://schemas.microsoft.com/office/drawing/2010/main" xmlns="" w="9525">
                   <a:solidFill>
                     <a:srgbClr val="000000"/>
                   </a:solidFill>
@@ -1703,7 +1703,7 @@
             </a:ln>
             <a:extLst>
               <a:ext uri="{91240B29-F687-4f45-9708-019B960494DF}">
-                <a14:hiddenLine xmlns="" xmlns:a14="http://schemas.microsoft.com/office/drawing/2010/main" w="9525">
+                <a14:hiddenLine xmlns:a14="http://schemas.microsoft.com/office/drawing/2010/main" xmlns="" w="9525">
                   <a:solidFill>
                     <a:srgbClr val="000000"/>
                   </a:solidFill>
@@ -1759,7 +1759,7 @@
             </a:ln>
             <a:extLst>
               <a:ext uri="{91240B29-F687-4f45-9708-019B960494DF}">
-                <a14:hiddenLine xmlns="" xmlns:a14="http://schemas.microsoft.com/office/drawing/2010/main" w="9525">
+                <a14:hiddenLine xmlns:a14="http://schemas.microsoft.com/office/drawing/2010/main" xmlns="" w="9525">
                   <a:solidFill>
                     <a:srgbClr val="000000"/>
                   </a:solidFill>
@@ -1849,7 +1849,7 @@
             </a:ln>
             <a:extLst>
               <a:ext uri="{91240B29-F687-4f45-9708-019B960494DF}">
-                <a14:hiddenLine xmlns="" xmlns:a14="http://schemas.microsoft.com/office/drawing/2010/main" w="9525">
+                <a14:hiddenLine xmlns:a14="http://schemas.microsoft.com/office/drawing/2010/main" xmlns="" w="9525">
                   <a:solidFill>
                     <a:srgbClr val="000000"/>
                   </a:solidFill>
@@ -1905,7 +1905,7 @@
             </a:ln>
             <a:extLst>
               <a:ext uri="{91240B29-F687-4f45-9708-019B960494DF}">
-                <a14:hiddenLine xmlns="" xmlns:a14="http://schemas.microsoft.com/office/drawing/2010/main" w="9525">
+                <a14:hiddenLine xmlns:a14="http://schemas.microsoft.com/office/drawing/2010/main" xmlns="" w="9525">
                   <a:solidFill>
                     <a:srgbClr val="000000"/>
                   </a:solidFill>
@@ -1995,7 +1995,7 @@
             </a:ln>
             <a:extLst>
               <a:ext uri="{91240B29-F687-4f45-9708-019B960494DF}">
-                <a14:hiddenLine xmlns="" xmlns:a14="http://schemas.microsoft.com/office/drawing/2010/main" w="9525">
+                <a14:hiddenLine xmlns:a14="http://schemas.microsoft.com/office/drawing/2010/main" xmlns="" w="9525">
                   <a:solidFill>
                     <a:srgbClr val="000000"/>
                   </a:solidFill>
@@ -2063,7 +2063,7 @@
             </a:ln>
             <a:extLst>
               <a:ext uri="{91240B29-F687-4f45-9708-019B960494DF}">
-                <a14:hiddenLine xmlns="" xmlns:a14="http://schemas.microsoft.com/office/drawing/2010/main" w="9525">
+                <a14:hiddenLine xmlns:a14="http://schemas.microsoft.com/office/drawing/2010/main" xmlns="" w="9525">
                   <a:solidFill>
                     <a:srgbClr val="000000"/>
                   </a:solidFill>
@@ -2153,7 +2153,7 @@
             </a:ln>
             <a:extLst>
               <a:ext uri="{91240B29-F687-4f45-9708-019B960494DF}">
-                <a14:hiddenLine xmlns="" xmlns:a14="http://schemas.microsoft.com/office/drawing/2010/main" w="9525">
+                <a14:hiddenLine xmlns:a14="http://schemas.microsoft.com/office/drawing/2010/main" xmlns="" w="9525">
                   <a:solidFill>
                     <a:srgbClr val="000000"/>
                   </a:solidFill>
@@ -2221,7 +2221,7 @@
             </a:ln>
             <a:extLst>
               <a:ext uri="{91240B29-F687-4f45-9708-019B960494DF}">
-                <a14:hiddenLine xmlns="" xmlns:a14="http://schemas.microsoft.com/office/drawing/2010/main" w="9525">
+                <a14:hiddenLine xmlns:a14="http://schemas.microsoft.com/office/drawing/2010/main" xmlns="" w="9525">
                   <a:solidFill>
                     <a:srgbClr val="000000"/>
                   </a:solidFill>
@@ -2311,7 +2311,7 @@
             </a:ln>
             <a:extLst>
               <a:ext uri="{91240B29-F687-4f45-9708-019B960494DF}">
-                <a14:hiddenLine xmlns="" xmlns:a14="http://schemas.microsoft.com/office/drawing/2010/main" w="9525">
+                <a14:hiddenLine xmlns:a14="http://schemas.microsoft.com/office/drawing/2010/main" xmlns="" w="9525">
                   <a:solidFill>
                     <a:srgbClr val="000000"/>
                   </a:solidFill>
@@ -2345,7 +2345,7 @@
             </a:ln>
             <a:extLst>
               <a:ext uri="{91240B29-F687-4f45-9708-019B960494DF}">
-                <a14:hiddenLine xmlns="" xmlns:a14="http://schemas.microsoft.com/office/drawing/2010/main" w="9525">
+                <a14:hiddenLine xmlns:a14="http://schemas.microsoft.com/office/drawing/2010/main" xmlns="" w="9525">
                   <a:solidFill>
                     <a:srgbClr val="000000"/>
                   </a:solidFill>
@@ -2435,7 +2435,7 @@
             </a:ln>
             <a:extLst>
               <a:ext uri="{91240B29-F687-4f45-9708-019B960494DF}">
-                <a14:hiddenLine xmlns="" xmlns:a14="http://schemas.microsoft.com/office/drawing/2010/main" w="9525">
+                <a14:hiddenLine xmlns:a14="http://schemas.microsoft.com/office/drawing/2010/main" xmlns="" w="9525">
                   <a:solidFill>
                     <a:srgbClr val="000000"/>
                   </a:solidFill>
@@ -2497,7 +2497,7 @@
             </a:ln>
             <a:extLst>
               <a:ext uri="{91240B29-F687-4f45-9708-019B960494DF}">
-                <a14:hiddenLine xmlns="" xmlns:a14="http://schemas.microsoft.com/office/drawing/2010/main" w="9525">
+                <a14:hiddenLine xmlns:a14="http://schemas.microsoft.com/office/drawing/2010/main" xmlns="" w="9525">
                   <a:solidFill>
                     <a:srgbClr val="000000"/>
                   </a:solidFill>
@@ -2559,7 +2559,7 @@
             </a:ln>
             <a:extLst>
               <a:ext uri="{91240B29-F687-4f45-9708-019B960494DF}">
-                <a14:hiddenLine xmlns="" xmlns:a14="http://schemas.microsoft.com/office/drawing/2010/main" w="9525">
+                <a14:hiddenLine xmlns:a14="http://schemas.microsoft.com/office/drawing/2010/main" xmlns="" w="9525">
                   <a:solidFill>
                     <a:srgbClr val="000000"/>
                   </a:solidFill>
@@ -2649,7 +2649,7 @@
             </a:ln>
             <a:extLst>
               <a:ext uri="{91240B29-F687-4f45-9708-019B960494DF}">
-                <a14:hiddenLine xmlns="" xmlns:a14="http://schemas.microsoft.com/office/drawing/2010/main" w="9525">
+                <a14:hiddenLine xmlns:a14="http://schemas.microsoft.com/office/drawing/2010/main" xmlns="" w="9525">
                   <a:solidFill>
                     <a:srgbClr val="000000"/>
                   </a:solidFill>
@@ -2717,7 +2717,7 @@
             </a:ln>
             <a:extLst>
               <a:ext uri="{91240B29-F687-4f45-9708-019B960494DF}">
-                <a14:hiddenLine xmlns="" xmlns:a14="http://schemas.microsoft.com/office/drawing/2010/main" w="9525">
+                <a14:hiddenLine xmlns:a14="http://schemas.microsoft.com/office/drawing/2010/main" xmlns="" w="9525">
                   <a:solidFill>
                     <a:srgbClr val="000000"/>
                   </a:solidFill>
@@ -2779,7 +2779,7 @@
             </a:ln>
             <a:extLst>
               <a:ext uri="{91240B29-F687-4f45-9708-019B960494DF}">
-                <a14:hiddenLine xmlns="" xmlns:a14="http://schemas.microsoft.com/office/drawing/2010/main" w="9525">
+                <a14:hiddenLine xmlns:a14="http://schemas.microsoft.com/office/drawing/2010/main" xmlns="" w="9525">
                   <a:solidFill>
                     <a:srgbClr val="000000"/>
                   </a:solidFill>
@@ -2869,7 +2869,7 @@
             </a:ln>
             <a:extLst>
               <a:ext uri="{91240B29-F687-4f45-9708-019B960494DF}">
-                <a14:hiddenLine xmlns="" xmlns:a14="http://schemas.microsoft.com/office/drawing/2010/main" w="9525">
+                <a14:hiddenLine xmlns:a14="http://schemas.microsoft.com/office/drawing/2010/main" xmlns="" w="9525">
                   <a:solidFill>
                     <a:srgbClr val="000000"/>
                   </a:solidFill>
@@ -2931,7 +2931,7 @@
             </a:ln>
             <a:extLst>
               <a:ext uri="{91240B29-F687-4f45-9708-019B960494DF}">
-                <a14:hiddenLine xmlns="" xmlns:a14="http://schemas.microsoft.com/office/drawing/2010/main" w="9525">
+                <a14:hiddenLine xmlns:a14="http://schemas.microsoft.com/office/drawing/2010/main" xmlns="" w="9525">
                   <a:solidFill>
                     <a:srgbClr val="000000"/>
                   </a:solidFill>
@@ -3021,7 +3021,7 @@
             </a:ln>
             <a:extLst>
               <a:ext uri="{91240B29-F687-4f45-9708-019B960494DF}">
-                <a14:hiddenLine xmlns="" xmlns:a14="http://schemas.microsoft.com/office/drawing/2010/main" w="9525">
+                <a14:hiddenLine xmlns:a14="http://schemas.microsoft.com/office/drawing/2010/main" xmlns="" w="9525">
                   <a:solidFill>
                     <a:srgbClr val="000000"/>
                   </a:solidFill>
@@ -3083,7 +3083,7 @@
             </a:ln>
             <a:extLst>
               <a:ext uri="{91240B29-F687-4f45-9708-019B960494DF}">
-                <a14:hiddenLine xmlns="" xmlns:a14="http://schemas.microsoft.com/office/drawing/2010/main" w="9525">
+                <a14:hiddenLine xmlns:a14="http://schemas.microsoft.com/office/drawing/2010/main" xmlns="" w="9525">
                   <a:solidFill>
                     <a:srgbClr val="000000"/>
                   </a:solidFill>
@@ -3173,7 +3173,7 @@
             </a:ln>
             <a:extLst>
               <a:ext uri="{91240B29-F687-4f45-9708-019B960494DF}">
-                <a14:hiddenLine xmlns="" xmlns:a14="http://schemas.microsoft.com/office/drawing/2010/main" w="9525">
+                <a14:hiddenLine xmlns:a14="http://schemas.microsoft.com/office/drawing/2010/main" xmlns="" w="9525">
                   <a:solidFill>
                     <a:srgbClr val="000000"/>
                   </a:solidFill>
@@ -3207,7 +3207,7 @@
             </a:ln>
             <a:extLst>
               <a:ext uri="{91240B29-F687-4f45-9708-019B960494DF}">
-                <a14:hiddenLine xmlns="" xmlns:a14="http://schemas.microsoft.com/office/drawing/2010/main" w="9525">
+                <a14:hiddenLine xmlns:a14="http://schemas.microsoft.com/office/drawing/2010/main" xmlns="" w="9525">
                   <a:solidFill>
                     <a:srgbClr val="000000"/>
                   </a:solidFill>
@@ -3272,7 +3272,7 @@
             </a:ln>
             <a:extLst>
               <a:ext uri="{91240B29-F687-4f45-9708-019B960494DF}">
-                <a14:hiddenLine xmlns="" xmlns:a14="http://schemas.microsoft.com/office/drawing/2010/main" w="9525">
+                <a14:hiddenLine xmlns:a14="http://schemas.microsoft.com/office/drawing/2010/main" xmlns="" w="9525">
                   <a:solidFill>
                     <a:srgbClr val="000000"/>
                   </a:solidFill>
@@ -3362,7 +3362,7 @@
             </a:ln>
             <a:extLst>
               <a:ext uri="{91240B29-F687-4f45-9708-019B960494DF}">
-                <a14:hiddenLine xmlns="" xmlns:a14="http://schemas.microsoft.com/office/drawing/2010/main" w="9525">
+                <a14:hiddenLine xmlns:a14="http://schemas.microsoft.com/office/drawing/2010/main" xmlns="" w="9525">
                   <a:solidFill>
                     <a:srgbClr val="000000"/>
                   </a:solidFill>
@@ -3424,7 +3424,7 @@
             </a:ln>
             <a:extLst>
               <a:ext uri="{91240B29-F687-4f45-9708-019B960494DF}">
-                <a14:hiddenLine xmlns="" xmlns:a14="http://schemas.microsoft.com/office/drawing/2010/main" w="9525">
+                <a14:hiddenLine xmlns:a14="http://schemas.microsoft.com/office/drawing/2010/main" xmlns="" w="9525">
                   <a:solidFill>
                     <a:srgbClr val="000000"/>
                   </a:solidFill>
@@ -3514,7 +3514,7 @@
             </a:ln>
             <a:extLst>
               <a:ext uri="{91240B29-F687-4f45-9708-019B960494DF}">
-                <a14:hiddenLine xmlns="" xmlns:a14="http://schemas.microsoft.com/office/drawing/2010/main" w="9525">
+                <a14:hiddenLine xmlns:a14="http://schemas.microsoft.com/office/drawing/2010/main" xmlns="" w="9525">
                   <a:solidFill>
                     <a:srgbClr val="000000"/>
                   </a:solidFill>
@@ -3604,7 +3604,7 @@
             </a:ln>
             <a:extLst>
               <a:ext uri="{91240B29-F687-4f45-9708-019B960494DF}">
-                <a14:hiddenLine xmlns="" xmlns:a14="http://schemas.microsoft.com/office/drawing/2010/main" w="9525">
+                <a14:hiddenLine xmlns:a14="http://schemas.microsoft.com/office/drawing/2010/main" xmlns="" w="9525">
                   <a:solidFill>
                     <a:srgbClr val="000000"/>
                   </a:solidFill>
@@ -3669,7 +3669,7 @@
             </a:ln>
             <a:extLst>
               <a:ext uri="{91240B29-F687-4f45-9708-019B960494DF}">
-                <a14:hiddenLine xmlns="" xmlns:a14="http://schemas.microsoft.com/office/drawing/2010/main" w="9525">
+                <a14:hiddenLine xmlns:a14="http://schemas.microsoft.com/office/drawing/2010/main" xmlns="" w="9525">
                   <a:solidFill>
                     <a:srgbClr val="000000"/>
                   </a:solidFill>
@@ -3731,7 +3731,7 @@
             </a:ln>
             <a:extLst>
               <a:ext uri="{91240B29-F687-4f45-9708-019B960494DF}">
-                <a14:hiddenLine xmlns="" xmlns:a14="http://schemas.microsoft.com/office/drawing/2010/main" w="9525">
+                <a14:hiddenLine xmlns:a14="http://schemas.microsoft.com/office/drawing/2010/main" xmlns="" w="9525">
                   <a:solidFill>
                     <a:srgbClr val="000000"/>
                   </a:solidFill>
@@ -3821,7 +3821,7 @@
             </a:ln>
             <a:extLst>
               <a:ext uri="{91240B29-F687-4f45-9708-019B960494DF}">
-                <a14:hiddenLine xmlns="" xmlns:a14="http://schemas.microsoft.com/office/drawing/2010/main" w="9525">
+                <a14:hiddenLine xmlns:a14="http://schemas.microsoft.com/office/drawing/2010/main" xmlns="" w="9525">
                   <a:solidFill>
                     <a:srgbClr val="000000"/>
                   </a:solidFill>
@@ -3911,7 +3911,7 @@
             </a:ln>
             <a:extLst>
               <a:ext uri="{91240B29-F687-4f45-9708-019B960494DF}">
-                <a14:hiddenLine xmlns="" xmlns:a14="http://schemas.microsoft.com/office/drawing/2010/main" w="9525">
+                <a14:hiddenLine xmlns:a14="http://schemas.microsoft.com/office/drawing/2010/main" xmlns="" w="9525">
                   <a:solidFill>
                     <a:srgbClr val="000000"/>
                   </a:solidFill>
@@ -3973,7 +3973,7 @@
             </a:ln>
             <a:extLst>
               <a:ext uri="{91240B29-F687-4f45-9708-019B960494DF}">
-                <a14:hiddenLine xmlns="" xmlns:a14="http://schemas.microsoft.com/office/drawing/2010/main" w="9525">
+                <a14:hiddenLine xmlns:a14="http://schemas.microsoft.com/office/drawing/2010/main" xmlns="" w="9525">
                   <a:solidFill>
                     <a:srgbClr val="000000"/>
                   </a:solidFill>
@@ -4093,7 +4093,7 @@
             </a:ln>
             <a:extLst>
               <a:ext uri="{91240B29-F687-4f45-9708-019B960494DF}">
-                <a14:hiddenLine xmlns="" xmlns:a14="http://schemas.microsoft.com/office/drawing/2010/main" w="9525">
+                <a14:hiddenLine xmlns:a14="http://schemas.microsoft.com/office/drawing/2010/main" xmlns="" w="9525">
                   <a:solidFill>
                     <a:srgbClr val="000000"/>
                   </a:solidFill>
@@ -4161,7 +4161,7 @@
             </a:ln>
             <a:extLst>
               <a:ext uri="{91240B29-F687-4f45-9708-019B960494DF}">
-                <a14:hiddenLine xmlns="" xmlns:a14="http://schemas.microsoft.com/office/drawing/2010/main" w="9525">
+                <a14:hiddenLine xmlns:a14="http://schemas.microsoft.com/office/drawing/2010/main" xmlns="" w="9525">
                   <a:solidFill>
                     <a:srgbClr val="000000"/>
                   </a:solidFill>
@@ -4251,7 +4251,7 @@
             </a:ln>
             <a:extLst>
               <a:ext uri="{91240B29-F687-4f45-9708-019B960494DF}">
-                <a14:hiddenLine xmlns="" xmlns:a14="http://schemas.microsoft.com/office/drawing/2010/main" w="9525">
+                <a14:hiddenLine xmlns:a14="http://schemas.microsoft.com/office/drawing/2010/main" xmlns="" w="9525">
                   <a:solidFill>
                     <a:srgbClr val="000000"/>
                   </a:solidFill>
@@ -4391,7 +4391,7 @@
           <a:p>
             <a:fld id="{48A87A34-81AB-432B-8DAE-1953F412C126}" type="datetimeFigureOut">
               <a:rPr lang="en-US" dirty="0"/>
-              <a:t>4/16/17</a:t>
+              <a:t>4/18/17</a:t>
             </a:fld>
             <a:endParaRPr lang="en-US" dirty="0"/>
           </a:p>
@@ -4653,7 +4653,7 @@
           <a:p>
             <a:fld id="{48A87A34-81AB-432B-8DAE-1953F412C126}" type="datetimeFigureOut">
               <a:rPr lang="en-US" dirty="0"/>
-              <a:t>4/16/17</a:t>
+              <a:t>4/18/17</a:t>
             </a:fld>
             <a:endParaRPr lang="en-US" dirty="0"/>
           </a:p>
@@ -4844,7 +4844,7 @@
           <a:p>
             <a:fld id="{48A87A34-81AB-432B-8DAE-1953F412C126}" type="datetimeFigureOut">
               <a:rPr lang="en-US" dirty="0"/>
-              <a:t>4/16/17</a:t>
+              <a:t>4/18/17</a:t>
             </a:fld>
             <a:endParaRPr lang="en-US" dirty="0"/>
           </a:p>
@@ -5102,7 +5102,7 @@
           <a:p>
             <a:fld id="{48A87A34-81AB-432B-8DAE-1953F412C126}" type="datetimeFigureOut">
               <a:rPr lang="en-US" dirty="0"/>
-              <a:t>4/16/17</a:t>
+              <a:t>4/18/17</a:t>
             </a:fld>
             <a:endParaRPr lang="en-US" dirty="0"/>
           </a:p>
@@ -5531,7 +5531,7 @@
           <a:p>
             <a:fld id="{48A87A34-81AB-432B-8DAE-1953F412C126}" type="datetimeFigureOut">
               <a:rPr lang="en-US" dirty="0"/>
-              <a:t>4/16/17</a:t>
+              <a:t>4/18/17</a:t>
             </a:fld>
             <a:endParaRPr lang="en-US" dirty="0"/>
           </a:p>
@@ -6072,7 +6072,7 @@
           <a:p>
             <a:fld id="{48A87A34-81AB-432B-8DAE-1953F412C126}" type="datetimeFigureOut">
               <a:rPr lang="en-US" dirty="0"/>
-              <a:t>4/16/17</a:t>
+              <a:t>4/18/17</a:t>
             </a:fld>
             <a:endParaRPr lang="en-US" dirty="0"/>
           </a:p>
@@ -6787,7 +6787,7 @@
           <a:p>
             <a:fld id="{48A87A34-81AB-432B-8DAE-1953F412C126}" type="datetimeFigureOut">
               <a:rPr lang="en-US" dirty="0"/>
-              <a:t>4/16/17</a:t>
+              <a:t>4/18/17</a:t>
             </a:fld>
             <a:endParaRPr lang="en-US" dirty="0"/>
           </a:p>
@@ -6952,7 +6952,7 @@
           <a:p>
             <a:fld id="{48A87A34-81AB-432B-8DAE-1953F412C126}" type="datetimeFigureOut">
               <a:rPr lang="en-US" dirty="0"/>
-              <a:t>4/16/17</a:t>
+              <a:t>4/18/17</a:t>
             </a:fld>
             <a:endParaRPr lang="en-US" dirty="0"/>
           </a:p>
@@ -7127,7 +7127,7 @@
           <a:p>
             <a:fld id="{48A87A34-81AB-432B-8DAE-1953F412C126}" type="datetimeFigureOut">
               <a:rPr lang="en-US" dirty="0"/>
-              <a:t>4/16/17</a:t>
+              <a:t>4/18/17</a:t>
             </a:fld>
             <a:endParaRPr lang="en-US" dirty="0"/>
           </a:p>
@@ -7292,7 +7292,7 @@
           <a:p>
             <a:fld id="{48A87A34-81AB-432B-8DAE-1953F412C126}" type="datetimeFigureOut">
               <a:rPr lang="en-US" dirty="0"/>
-              <a:t>4/16/17</a:t>
+              <a:t>4/18/17</a:t>
             </a:fld>
             <a:endParaRPr lang="en-US" dirty="0"/>
           </a:p>
@@ -7537,7 +7537,7 @@
           <a:p>
             <a:fld id="{48A87A34-81AB-432B-8DAE-1953F412C126}" type="datetimeFigureOut">
               <a:rPr lang="en-US" dirty="0"/>
-              <a:t>4/16/17</a:t>
+              <a:t>4/18/17</a:t>
             </a:fld>
             <a:endParaRPr lang="en-US" dirty="0"/>
           </a:p>
@@ -7764,7 +7764,7 @@
           <a:p>
             <a:fld id="{48A87A34-81AB-432B-8DAE-1953F412C126}" type="datetimeFigureOut">
               <a:rPr lang="en-US" dirty="0"/>
-              <a:t>4/16/17</a:t>
+              <a:t>4/18/17</a:t>
             </a:fld>
             <a:endParaRPr lang="en-US" dirty="0"/>
           </a:p>
@@ -8140,7 +8140,7 @@
           <a:p>
             <a:fld id="{48A87A34-81AB-432B-8DAE-1953F412C126}" type="datetimeFigureOut">
               <a:rPr lang="en-US" dirty="0"/>
-              <a:t>4/16/17</a:t>
+              <a:t>4/18/17</a:t>
             </a:fld>
             <a:endParaRPr lang="en-US" dirty="0"/>
           </a:p>
@@ -8253,7 +8253,7 @@
           <a:p>
             <a:fld id="{48A87A34-81AB-432B-8DAE-1953F412C126}" type="datetimeFigureOut">
               <a:rPr lang="en-US" dirty="0"/>
-              <a:t>4/16/17</a:t>
+              <a:t>4/18/17</a:t>
             </a:fld>
             <a:endParaRPr lang="en-US" dirty="0"/>
           </a:p>
@@ -8343,7 +8343,7 @@
           <a:p>
             <a:fld id="{48A87A34-81AB-432B-8DAE-1953F412C126}" type="datetimeFigureOut">
               <a:rPr lang="en-US" dirty="0"/>
-              <a:t>4/16/17</a:t>
+              <a:t>4/18/17</a:t>
             </a:fld>
             <a:endParaRPr lang="en-US" dirty="0"/>
           </a:p>
@@ -8587,7 +8587,7 @@
           <a:p>
             <a:fld id="{48A87A34-81AB-432B-8DAE-1953F412C126}" type="datetimeFigureOut">
               <a:rPr lang="en-US" dirty="0"/>
-              <a:t>4/16/17</a:t>
+              <a:t>4/18/17</a:t>
             </a:fld>
             <a:endParaRPr lang="en-US" dirty="0"/>
           </a:p>
@@ -8862,7 +8862,7 @@
           <a:p>
             <a:fld id="{48A87A34-81AB-432B-8DAE-1953F412C126}" type="datetimeFigureOut">
               <a:rPr lang="en-US" dirty="0"/>
-              <a:t>4/16/17</a:t>
+              <a:t>4/18/17</a:t>
             </a:fld>
             <a:endParaRPr lang="en-US" dirty="0"/>
           </a:p>
@@ -8973,7 +8973,7 @@
           <a:noFill/>
           <a:extLst>
             <a:ext uri="{909E8E84-426E-40dd-AFC4-6F175D3DCCD1}">
-              <a14:hiddenFill xmlns="" xmlns:a14="http://schemas.microsoft.com/office/drawing/2010/main">
+              <a14:hiddenFill xmlns:a14="http://schemas.microsoft.com/office/drawing/2010/main" xmlns="">
                 <a:solidFill>
                   <a:srgbClr val="FFFFFF"/>
                 </a:solidFill>
@@ -9047,7 +9047,7 @@
               </a:ln>
               <a:extLst>
                 <a:ext uri="{91240B29-F687-4f45-9708-019B960494DF}">
-                  <a14:hiddenLine xmlns="" xmlns:a14="http://schemas.microsoft.com/office/drawing/2010/main" w="9525">
+                  <a14:hiddenLine xmlns:a14="http://schemas.microsoft.com/office/drawing/2010/main" xmlns="" w="9525">
                     <a:solidFill>
                       <a:srgbClr val="000000"/>
                     </a:solidFill>
@@ -9137,7 +9137,7 @@
               </a:ln>
               <a:extLst>
                 <a:ext uri="{91240B29-F687-4f45-9708-019B960494DF}">
-                  <a14:hiddenLine xmlns="" xmlns:a14="http://schemas.microsoft.com/office/drawing/2010/main" w="9525">
+                  <a14:hiddenLine xmlns:a14="http://schemas.microsoft.com/office/drawing/2010/main" xmlns="" w="9525">
                     <a:solidFill>
                       <a:srgbClr val="000000"/>
                     </a:solidFill>
@@ -9227,7 +9227,7 @@
               </a:ln>
               <a:extLst>
                 <a:ext uri="{91240B29-F687-4f45-9708-019B960494DF}">
-                  <a14:hiddenLine xmlns="" xmlns:a14="http://schemas.microsoft.com/office/drawing/2010/main" w="9525">
+                  <a14:hiddenLine xmlns:a14="http://schemas.microsoft.com/office/drawing/2010/main" xmlns="" w="9525">
                     <a:solidFill>
                       <a:srgbClr val="000000"/>
                     </a:solidFill>
@@ -9289,7 +9289,7 @@
               </a:ln>
               <a:extLst>
                 <a:ext uri="{91240B29-F687-4f45-9708-019B960494DF}">
-                  <a14:hiddenLine xmlns="" xmlns:a14="http://schemas.microsoft.com/office/drawing/2010/main" w="9525">
+                  <a14:hiddenLine xmlns:a14="http://schemas.microsoft.com/office/drawing/2010/main" xmlns="" w="9525">
                     <a:solidFill>
                       <a:srgbClr val="000000"/>
                     </a:solidFill>
@@ -9379,7 +9379,7 @@
               </a:ln>
               <a:extLst>
                 <a:ext uri="{91240B29-F687-4f45-9708-019B960494DF}">
-                  <a14:hiddenLine xmlns="" xmlns:a14="http://schemas.microsoft.com/office/drawing/2010/main" w="9525">
+                  <a14:hiddenLine xmlns:a14="http://schemas.microsoft.com/office/drawing/2010/main" xmlns="" w="9525">
                     <a:solidFill>
                       <a:srgbClr val="000000"/>
                     </a:solidFill>
@@ -9441,7 +9441,7 @@
               </a:ln>
               <a:extLst>
                 <a:ext uri="{91240B29-F687-4f45-9708-019B960494DF}">
-                  <a14:hiddenLine xmlns="" xmlns:a14="http://schemas.microsoft.com/office/drawing/2010/main" w="9525">
+                  <a14:hiddenLine xmlns:a14="http://schemas.microsoft.com/office/drawing/2010/main" xmlns="" w="9525">
                     <a:solidFill>
                       <a:srgbClr val="000000"/>
                     </a:solidFill>
@@ -9503,7 +9503,7 @@
               </a:ln>
               <a:extLst>
                 <a:ext uri="{91240B29-F687-4f45-9708-019B960494DF}">
-                  <a14:hiddenLine xmlns="" xmlns:a14="http://schemas.microsoft.com/office/drawing/2010/main" w="9525">
+                  <a14:hiddenLine xmlns:a14="http://schemas.microsoft.com/office/drawing/2010/main" xmlns="" w="9525">
                     <a:solidFill>
                       <a:srgbClr val="000000"/>
                     </a:solidFill>
@@ -9593,7 +9593,7 @@
               </a:ln>
               <a:extLst>
                 <a:ext uri="{91240B29-F687-4f45-9708-019B960494DF}">
-                  <a14:hiddenLine xmlns="" xmlns:a14="http://schemas.microsoft.com/office/drawing/2010/main" w="9525">
+                  <a14:hiddenLine xmlns:a14="http://schemas.microsoft.com/office/drawing/2010/main" xmlns="" w="9525">
                     <a:solidFill>
                       <a:srgbClr val="000000"/>
                     </a:solidFill>
@@ -9683,7 +9683,7 @@
               </a:ln>
               <a:extLst>
                 <a:ext uri="{91240B29-F687-4f45-9708-019B960494DF}">
-                  <a14:hiddenLine xmlns="" xmlns:a14="http://schemas.microsoft.com/office/drawing/2010/main" w="9525">
+                  <a14:hiddenLine xmlns:a14="http://schemas.microsoft.com/office/drawing/2010/main" xmlns="" w="9525">
                     <a:solidFill>
                       <a:srgbClr val="000000"/>
                     </a:solidFill>
@@ -9745,7 +9745,7 @@
               </a:ln>
               <a:extLst>
                 <a:ext uri="{91240B29-F687-4f45-9708-019B960494DF}">
-                  <a14:hiddenLine xmlns="" xmlns:a14="http://schemas.microsoft.com/office/drawing/2010/main" w="9525">
+                  <a14:hiddenLine xmlns:a14="http://schemas.microsoft.com/office/drawing/2010/main" xmlns="" w="9525">
                     <a:solidFill>
                       <a:srgbClr val="000000"/>
                     </a:solidFill>
@@ -9855,7 +9855,7 @@
               </a:ln>
               <a:extLst>
                 <a:ext uri="{91240B29-F687-4f45-9708-019B960494DF}">
-                  <a14:hiddenLine xmlns="" xmlns:a14="http://schemas.microsoft.com/office/drawing/2010/main" w="9525">
+                  <a14:hiddenLine xmlns:a14="http://schemas.microsoft.com/office/drawing/2010/main" xmlns="" w="9525">
                     <a:solidFill>
                       <a:srgbClr val="000000"/>
                     </a:solidFill>
@@ -9939,7 +9939,7 @@
               </a:ln>
               <a:extLst>
                 <a:ext uri="{91240B29-F687-4f45-9708-019B960494DF}">
-                  <a14:hiddenLine xmlns="" xmlns:a14="http://schemas.microsoft.com/office/drawing/2010/main" w="9525">
+                  <a14:hiddenLine xmlns:a14="http://schemas.microsoft.com/office/drawing/2010/main" xmlns="" w="9525">
                     <a:solidFill>
                       <a:srgbClr val="000000"/>
                     </a:solidFill>
@@ -10001,7 +10001,7 @@
               </a:ln>
               <a:extLst>
                 <a:ext uri="{91240B29-F687-4f45-9708-019B960494DF}">
-                  <a14:hiddenLine xmlns="" xmlns:a14="http://schemas.microsoft.com/office/drawing/2010/main" w="9525">
+                  <a14:hiddenLine xmlns:a14="http://schemas.microsoft.com/office/drawing/2010/main" xmlns="" w="9525">
                     <a:solidFill>
                       <a:srgbClr val="000000"/>
                     </a:solidFill>
@@ -10063,7 +10063,7 @@
               </a:ln>
               <a:extLst>
                 <a:ext uri="{91240B29-F687-4f45-9708-019B960494DF}">
-                  <a14:hiddenLine xmlns="" xmlns:a14="http://schemas.microsoft.com/office/drawing/2010/main" w="9525">
+                  <a14:hiddenLine xmlns:a14="http://schemas.microsoft.com/office/drawing/2010/main" xmlns="" w="9525">
                     <a:solidFill>
                       <a:srgbClr val="000000"/>
                     </a:solidFill>
@@ -10153,7 +10153,7 @@
               </a:ln>
               <a:extLst>
                 <a:ext uri="{91240B29-F687-4f45-9708-019B960494DF}">
-                  <a14:hiddenLine xmlns="" xmlns:a14="http://schemas.microsoft.com/office/drawing/2010/main" w="9525">
+                  <a14:hiddenLine xmlns:a14="http://schemas.microsoft.com/office/drawing/2010/main" xmlns="" w="9525">
                     <a:solidFill>
                       <a:srgbClr val="000000"/>
                     </a:solidFill>
@@ -10187,7 +10187,7 @@
               </a:ln>
               <a:extLst>
                 <a:ext uri="{91240B29-F687-4f45-9708-019B960494DF}">
-                  <a14:hiddenLine xmlns="" xmlns:a14="http://schemas.microsoft.com/office/drawing/2010/main" w="9525">
+                  <a14:hiddenLine xmlns:a14="http://schemas.microsoft.com/office/drawing/2010/main" xmlns="" w="9525">
                     <a:solidFill>
                       <a:srgbClr val="000000"/>
                     </a:solidFill>
@@ -10252,7 +10252,7 @@
               </a:ln>
               <a:extLst>
                 <a:ext uri="{91240B29-F687-4f45-9708-019B960494DF}">
-                  <a14:hiddenLine xmlns="" xmlns:a14="http://schemas.microsoft.com/office/drawing/2010/main" w="9525">
+                  <a14:hiddenLine xmlns:a14="http://schemas.microsoft.com/office/drawing/2010/main" xmlns="" w="9525">
                     <a:solidFill>
                       <a:srgbClr val="000000"/>
                     </a:solidFill>
@@ -10342,7 +10342,7 @@
               </a:ln>
               <a:extLst>
                 <a:ext uri="{91240B29-F687-4f45-9708-019B960494DF}">
-                  <a14:hiddenLine xmlns="" xmlns:a14="http://schemas.microsoft.com/office/drawing/2010/main" w="9525">
+                  <a14:hiddenLine xmlns:a14="http://schemas.microsoft.com/office/drawing/2010/main" xmlns="" w="9525">
                     <a:solidFill>
                       <a:srgbClr val="000000"/>
                     </a:solidFill>
@@ -10404,7 +10404,7 @@
               </a:ln>
               <a:extLst>
                 <a:ext uri="{91240B29-F687-4f45-9708-019B960494DF}">
-                  <a14:hiddenLine xmlns="" xmlns:a14="http://schemas.microsoft.com/office/drawing/2010/main" w="9525">
+                  <a14:hiddenLine xmlns:a14="http://schemas.microsoft.com/office/drawing/2010/main" xmlns="" w="9525">
                     <a:solidFill>
                       <a:srgbClr val="000000"/>
                     </a:solidFill>
@@ -10494,7 +10494,7 @@
               </a:ln>
               <a:extLst>
                 <a:ext uri="{91240B29-F687-4f45-9708-019B960494DF}">
-                  <a14:hiddenLine xmlns="" xmlns:a14="http://schemas.microsoft.com/office/drawing/2010/main" w="9525">
+                  <a14:hiddenLine xmlns:a14="http://schemas.microsoft.com/office/drawing/2010/main" xmlns="" w="9525">
                     <a:solidFill>
                       <a:srgbClr val="000000"/>
                     </a:solidFill>
@@ -10559,7 +10559,7 @@
               </a:ln>
               <a:extLst>
                 <a:ext uri="{91240B29-F687-4f45-9708-019B960494DF}">
-                  <a14:hiddenLine xmlns="" xmlns:a14="http://schemas.microsoft.com/office/drawing/2010/main" w="9525">
+                  <a14:hiddenLine xmlns:a14="http://schemas.microsoft.com/office/drawing/2010/main" xmlns="" w="9525">
                     <a:solidFill>
                       <a:srgbClr val="000000"/>
                     </a:solidFill>
@@ -10621,7 +10621,7 @@
               </a:ln>
               <a:extLst>
                 <a:ext uri="{91240B29-F687-4f45-9708-019B960494DF}">
-                  <a14:hiddenLine xmlns="" xmlns:a14="http://schemas.microsoft.com/office/drawing/2010/main" w="9525">
+                  <a14:hiddenLine xmlns:a14="http://schemas.microsoft.com/office/drawing/2010/main" xmlns="" w="9525">
                     <a:solidFill>
                       <a:srgbClr val="000000"/>
                     </a:solidFill>
@@ -10711,7 +10711,7 @@
               </a:ln>
               <a:extLst>
                 <a:ext uri="{91240B29-F687-4f45-9708-019B960494DF}">
-                  <a14:hiddenLine xmlns="" xmlns:a14="http://schemas.microsoft.com/office/drawing/2010/main" w="9525">
+                  <a14:hiddenLine xmlns:a14="http://schemas.microsoft.com/office/drawing/2010/main" xmlns="" w="9525">
                     <a:solidFill>
                       <a:srgbClr val="000000"/>
                     </a:solidFill>
@@ -10801,7 +10801,7 @@
               </a:ln>
               <a:extLst>
                 <a:ext uri="{91240B29-F687-4f45-9708-019B960494DF}">
-                  <a14:hiddenLine xmlns="" xmlns:a14="http://schemas.microsoft.com/office/drawing/2010/main" w="9525">
+                  <a14:hiddenLine xmlns:a14="http://schemas.microsoft.com/office/drawing/2010/main" xmlns="" w="9525">
                     <a:solidFill>
                       <a:srgbClr val="000000"/>
                     </a:solidFill>
@@ -10866,7 +10866,7 @@
               </a:ln>
               <a:extLst>
                 <a:ext uri="{91240B29-F687-4f45-9708-019B960494DF}">
-                  <a14:hiddenLine xmlns="" xmlns:a14="http://schemas.microsoft.com/office/drawing/2010/main" w="9525">
+                  <a14:hiddenLine xmlns:a14="http://schemas.microsoft.com/office/drawing/2010/main" xmlns="" w="9525">
                     <a:solidFill>
                       <a:srgbClr val="000000"/>
                     </a:solidFill>
@@ -10986,7 +10986,7 @@
               </a:ln>
               <a:extLst>
                 <a:ext uri="{91240B29-F687-4f45-9708-019B960494DF}">
-                  <a14:hiddenLine xmlns="" xmlns:a14="http://schemas.microsoft.com/office/drawing/2010/main" w="9525">
+                  <a14:hiddenLine xmlns:a14="http://schemas.microsoft.com/office/drawing/2010/main" xmlns="" w="9525">
                     <a:solidFill>
                       <a:srgbClr val="000000"/>
                     </a:solidFill>
@@ -11084,7 +11084,7 @@
               </a:ln>
               <a:extLst>
                 <a:ext uri="{91240B29-F687-4f45-9708-019B960494DF}">
-                  <a14:hiddenLine xmlns="" xmlns:a14="http://schemas.microsoft.com/office/drawing/2010/main" w="9525">
+                  <a14:hiddenLine xmlns:a14="http://schemas.microsoft.com/office/drawing/2010/main" xmlns="" w="9525">
                     <a:solidFill>
                       <a:srgbClr val="000000"/>
                     </a:solidFill>
@@ -11199,7 +11199,7 @@
               </a:ln>
               <a:extLst>
                 <a:ext uri="{91240B29-F687-4f45-9708-019B960494DF}">
-                  <a14:hiddenLine xmlns="" xmlns:a14="http://schemas.microsoft.com/office/drawing/2010/main" w="9525">
+                  <a14:hiddenLine xmlns:a14="http://schemas.microsoft.com/office/drawing/2010/main" xmlns="" w="9525">
                     <a:solidFill>
                       <a:srgbClr val="000000"/>
                     </a:solidFill>
@@ -11289,7 +11289,7 @@
               </a:ln>
               <a:extLst>
                 <a:ext uri="{91240B29-F687-4f45-9708-019B960494DF}">
-                  <a14:hiddenLine xmlns="" xmlns:a14="http://schemas.microsoft.com/office/drawing/2010/main" w="9525">
+                  <a14:hiddenLine xmlns:a14="http://schemas.microsoft.com/office/drawing/2010/main" xmlns="" w="9525">
                     <a:solidFill>
                       <a:srgbClr val="000000"/>
                     </a:solidFill>
@@ -11354,7 +11354,7 @@
               </a:ln>
               <a:extLst>
                 <a:ext uri="{91240B29-F687-4f45-9708-019B960494DF}">
-                  <a14:hiddenLine xmlns="" xmlns:a14="http://schemas.microsoft.com/office/drawing/2010/main" w="9525">
+                  <a14:hiddenLine xmlns:a14="http://schemas.microsoft.com/office/drawing/2010/main" xmlns="" w="9525">
                     <a:solidFill>
                       <a:srgbClr val="000000"/>
                     </a:solidFill>
@@ -11444,7 +11444,7 @@
               </a:ln>
               <a:extLst>
                 <a:ext uri="{91240B29-F687-4f45-9708-019B960494DF}">
-                  <a14:hiddenLine xmlns="" xmlns:a14="http://schemas.microsoft.com/office/drawing/2010/main" w="9525">
+                  <a14:hiddenLine xmlns:a14="http://schemas.microsoft.com/office/drawing/2010/main" xmlns="" w="9525">
                     <a:solidFill>
                       <a:srgbClr val="000000"/>
                     </a:solidFill>
@@ -11512,7 +11512,7 @@
               </a:ln>
               <a:extLst>
                 <a:ext uri="{91240B29-F687-4f45-9708-019B960494DF}">
-                  <a14:hiddenLine xmlns="" xmlns:a14="http://schemas.microsoft.com/office/drawing/2010/main" w="9525">
+                  <a14:hiddenLine xmlns:a14="http://schemas.microsoft.com/office/drawing/2010/main" xmlns="" w="9525">
                     <a:solidFill>
                       <a:srgbClr val="000000"/>
                     </a:solidFill>
@@ -11602,7 +11602,7 @@
               </a:ln>
               <a:extLst>
                 <a:ext uri="{91240B29-F687-4f45-9708-019B960494DF}">
-                  <a14:hiddenLine xmlns="" xmlns:a14="http://schemas.microsoft.com/office/drawing/2010/main" w="9525">
+                  <a14:hiddenLine xmlns:a14="http://schemas.microsoft.com/office/drawing/2010/main" xmlns="" w="9525">
                     <a:solidFill>
                       <a:srgbClr val="000000"/>
                     </a:solidFill>
@@ -11670,7 +11670,7 @@
               </a:ln>
               <a:extLst>
                 <a:ext uri="{91240B29-F687-4f45-9708-019B960494DF}">
-                  <a14:hiddenLine xmlns="" xmlns:a14="http://schemas.microsoft.com/office/drawing/2010/main" w="9525">
+                  <a14:hiddenLine xmlns:a14="http://schemas.microsoft.com/office/drawing/2010/main" xmlns="" w="9525">
                     <a:solidFill>
                       <a:srgbClr val="000000"/>
                     </a:solidFill>
@@ -11760,7 +11760,7 @@
               </a:ln>
               <a:extLst>
                 <a:ext uri="{91240B29-F687-4f45-9708-019B960494DF}">
-                  <a14:hiddenLine xmlns="" xmlns:a14="http://schemas.microsoft.com/office/drawing/2010/main" w="9525">
+                  <a14:hiddenLine xmlns:a14="http://schemas.microsoft.com/office/drawing/2010/main" xmlns="" w="9525">
                     <a:solidFill>
                       <a:srgbClr val="000000"/>
                     </a:solidFill>
@@ -11794,7 +11794,7 @@
               </a:ln>
               <a:extLst>
                 <a:ext uri="{91240B29-F687-4f45-9708-019B960494DF}">
-                  <a14:hiddenLine xmlns="" xmlns:a14="http://schemas.microsoft.com/office/drawing/2010/main" w="9525">
+                  <a14:hiddenLine xmlns:a14="http://schemas.microsoft.com/office/drawing/2010/main" xmlns="" w="9525">
                     <a:solidFill>
                       <a:srgbClr val="000000"/>
                     </a:solidFill>
@@ -11935,7 +11935,7 @@
             <a:fld id="{48A87A34-81AB-432B-8DAE-1953F412C126}" type="datetimeFigureOut">
               <a:rPr lang="en-US" dirty="0"/>
               <a:pPr/>
-              <a:t>4/16/17</a:t>
+              <a:t>4/18/17</a:t>
             </a:fld>
             <a:endParaRPr lang="en-US" dirty="0"/>
           </a:p>
@@ -12600,7 +12600,15 @@
           <a:p>
             <a:r>
               <a:rPr lang="en-US" dirty="0" smtClean="0"/>
-              <a:t>Implement visual in the user interface</a:t>
+              <a:t>Implement </a:t>
+            </a:r>
+            <a:r>
+              <a:rPr lang="en-US" dirty="0" smtClean="0"/>
+              <a:t>visuals </a:t>
+            </a:r>
+            <a:r>
+              <a:rPr lang="en-US" dirty="0" smtClean="0"/>
+              <a:t>in the user interface</a:t>
             </a:r>
           </a:p>
           <a:p>
@@ -12614,8 +12622,51 @@
             </a:r>
             <a:r>
               <a:rPr lang="en-US" dirty="0" smtClean="0"/>
-              <a:t> tests, etc.</a:t>
+              <a:t> tests, etc</a:t>
             </a:r>
+            <a:r>
+              <a:rPr lang="en-US" dirty="0" smtClean="0"/>
+              <a:t>.</a:t>
+            </a:r>
+          </a:p>
+          <a:p>
+            <a:r>
+              <a:rPr lang="en-US" dirty="0" smtClean="0"/>
+              <a:t>Solve </a:t>
+            </a:r>
+            <a:r>
+              <a:rPr lang="en-US" smtClean="0"/>
+              <a:t>the data sync </a:t>
+            </a:r>
+            <a:r>
+              <a:rPr lang="en-US" dirty="0" smtClean="0"/>
+              <a:t>problem by connecting directly to </a:t>
+            </a:r>
+            <a:r>
+              <a:rPr lang="en-US" dirty="0" err="1" smtClean="0"/>
+              <a:t>ghtorrent</a:t>
+            </a:r>
+            <a:endParaRPr lang="en-US" dirty="0"/>
+          </a:p>
+          <a:p>
+            <a:pPr lvl="1"/>
+            <a:r>
+              <a:rPr lang="en-US" dirty="0"/>
+              <a:t>http://</a:t>
+            </a:r>
+            <a:r>
+              <a:rPr lang="en-US" dirty="0" err="1"/>
+              <a:t>ghtorrent.org</a:t>
+            </a:r>
+            <a:r>
+              <a:rPr lang="en-US" dirty="0"/>
+              <a:t>/</a:t>
+            </a:r>
+            <a:r>
+              <a:rPr lang="en-US" dirty="0" err="1"/>
+              <a:t>mysql.html</a:t>
+            </a:r>
+            <a:endParaRPr lang="en-US" dirty="0" smtClean="0"/>
           </a:p>
           <a:p>
             <a:endParaRPr lang="en-US" dirty="0"/>
@@ -12702,11 +12753,7 @@
             </a:r>
             <a:r>
               <a:rPr lang="en-US" smtClean="0"/>
-              <a:t>is </a:t>
-            </a:r>
-            <a:r>
-              <a:rPr lang="en-US" smtClean="0"/>
-              <a:t>52gb archive</a:t>
+              <a:t>is 52gb archive</a:t>
             </a:r>
             <a:endParaRPr lang="en-US" dirty="0" smtClean="0"/>
           </a:p>

</xml_diff>